<commit_message>
update 0505 meeting record
</commit_message>
<xml_diff>
--- a/Weekly Meeting/0504Meeting.pptx
+++ b/Weekly Meeting/0504Meeting.pptx
@@ -3019,11 +3019,13 @@
         <p:spPr>
           <a:xfrm>
             <a:off x="838200" y="1582420"/>
-            <a:ext cx="10515600" cy="4694555"/>
+            <a:ext cx="10311130" cy="5202555"/>
           </a:xfrm>
         </p:spPr>
         <p:txBody>
-          <a:bodyPr/>
+          <a:bodyPr>
+            <a:normAutofit lnSpcReduction="20000"/>
+          </a:bodyPr>
           <a:p>
             <a:pPr>
               <a:lnSpc>
@@ -3072,11 +3074,17 @@
             </a:pPr>
             <a:r>
               <a:rPr lang="zh-CN" altLang="en-US"/>
-              <a:t>講解時間或許是一個小時，</a:t>
+              <a:t>講解時間（</a:t>
+            </a:r>
+            <a:r>
+              <a:rPr lang="en-US" altLang="zh-CN">
+                <a:sym typeface="+mn-ea"/>
+              </a:rPr>
+              <a:t>25min</a:t>
             </a:r>
             <a:r>
               <a:rPr lang="zh-CN" altLang="en-US"/>
-              <a:t>要怎樣分配？</a:t>
+              <a:t>），要怎樣分配？</a:t>
             </a:r>
             <a:endParaRPr lang="zh-CN" altLang="en-US"/>
           </a:p>
@@ -3088,11 +3096,37 @@
             </a:pPr>
             <a:r>
               <a:rPr lang="zh-CN" altLang="en-US"/>
-              <a:t>講解方式，大概是</a:t>
-            </a:r>
-            <a:r>
-              <a:rPr lang="zh-CN" altLang="en-US"/>
-              <a:t>怎樣分工？</a:t>
+              <a:t>講解方式，大概是怎樣分工？</a:t>
+            </a:r>
+            <a:r>
+              <a:rPr lang="zh-CN" altLang="en-US">
+                <a:sym typeface="+mn-ea"/>
+              </a:rPr>
+              <a:t>（</a:t>
+            </a:r>
+            <a:r>
+              <a:rPr lang="en-US" altLang="zh-CN">
+                <a:sym typeface="+mn-ea"/>
+              </a:rPr>
+              <a:t>5</a:t>
+            </a:r>
+            <a:r>
+              <a:rPr lang="zh-CN" altLang="en-US">
+                <a:sym typeface="+mn-ea"/>
+              </a:rPr>
+              <a:t>個人都講，每人</a:t>
+            </a:r>
+            <a:r>
+              <a:rPr lang="en-US" altLang="zh-CN">
+                <a:sym typeface="+mn-ea"/>
+              </a:rPr>
+              <a:t>5min</a:t>
+            </a:r>
+            <a:r>
+              <a:rPr lang="zh-CN" altLang="en-US">
+                <a:sym typeface="+mn-ea"/>
+              </a:rPr>
+              <a:t>）</a:t>
             </a:r>
             <a:endParaRPr lang="zh-CN" altLang="en-US"/>
           </a:p>
@@ -3104,11 +3138,31 @@
             </a:pPr>
             <a:r>
               <a:rPr lang="zh-CN" altLang="en-US"/>
-              <a:t>老師是不是有提到過，需要大家提一些</a:t>
+              <a:t>老師是不是有提到過，需要大家提至少</a:t>
+            </a:r>
+            <a:r>
+              <a:rPr lang="en-US" altLang="zh-CN"/>
+              <a:t>2</a:t>
             </a:r>
             <a:r>
               <a:rPr lang="zh-CN" altLang="en-US"/>
-              <a:t>問題？</a:t>
+              <a:t>个问题（</a:t>
+            </a:r>
+            <a:r>
+              <a:rPr lang="zh-CN" altLang="en-US" u="sng"/>
+              <a:t>理论</a:t>
+            </a:r>
+            <a:r>
+              <a:rPr lang="en-US" altLang="zh-CN"/>
+              <a:t>+</a:t>
+            </a:r>
+            <a:r>
+              <a:rPr lang="zh-CN" altLang="en-US" u="sng"/>
+              <a:t>应用</a:t>
+            </a:r>
+            <a:r>
+              <a:rPr lang="zh-CN" altLang="en-US"/>
+              <a:t>）</a:t>
             </a:r>
             <a:endParaRPr lang="zh-CN" altLang="en-US"/>
           </a:p>
@@ -3124,7 +3178,23 @@
             </a:r>
             <a:r>
               <a:rPr lang="zh-CN" altLang="en-US"/>
-              <a:t>日（週六）匯總初稿，</a:t>
+              <a:t>日（週六）</a:t>
+            </a:r>
+            <a:r>
+              <a:rPr lang="en-US" altLang="zh-CN"/>
+              <a:t>21</a:t>
+            </a:r>
+            <a:r>
+              <a:rPr lang="zh-CN" altLang="en-US"/>
+              <a:t>：</a:t>
+            </a:r>
+            <a:r>
+              <a:rPr lang="en-US" altLang="zh-CN"/>
+              <a:t>00</a:t>
+            </a:r>
+            <a:r>
+              <a:rPr lang="zh-CN" altLang="en-US"/>
+              <a:t>匯總初稿。</a:t>
             </a:r>
             <a:r>
               <a:rPr lang="en-US" altLang="zh-CN"/>
@@ -3132,7 +3202,23 @@
             </a:r>
             <a:r>
               <a:rPr lang="zh-CN" altLang="en-US"/>
-              <a:t>日（週日）試講，大家</a:t>
+              <a:t>日（週日）</a:t>
+            </a:r>
+            <a:r>
+              <a:rPr lang="en-US" altLang="zh-CN"/>
+              <a:t>21</a:t>
+            </a:r>
+            <a:r>
+              <a:rPr lang="zh-CN" altLang="en-US"/>
+              <a:t>：</a:t>
+            </a:r>
+            <a:r>
+              <a:rPr lang="en-US" altLang="zh-CN"/>
+              <a:t>00</a:t>
+            </a:r>
+            <a:r>
+              <a:rPr lang="zh-CN" altLang="en-US"/>
+              <a:t>試講，大家</a:t>
             </a:r>
             <a:r>
               <a:rPr lang="zh-CN" altLang="en-US"/>

</xml_diff>